<commit_message>
direct people to EXERCISES.pdf instead of EXERCISES.md, add PDF version of EXERCISES
</commit_message>
<xml_diff>
--- a/installing_software/installing_software.pptx
+++ b/installing_software/installing_software.pptx
@@ -258,7 +258,7 @@
           <a:p>
             <a:fld id="{EFDA08D6-E137-3341-A5EE-84219A24203E}" type="datetimeFigureOut">
               <a:rPr lang="en-US" smtClean="0"/>
-              <a:t>8/9/24</a:t>
+              <a:t>8/13/24</a:t>
             </a:fld>
             <a:endParaRPr lang="en-US"/>
           </a:p>
@@ -10856,7 +10856,7 @@
               <a:rPr lang="en-US" sz="2800" dirty="0" err="1">
                 <a:latin typeface="Century Gothic" panose="020B0502020202020204" pitchFamily="34" charset="0"/>
               </a:rPr>
-              <a:t>EXERCISES.md</a:t>
+              <a:t>EXERCISES.pdf</a:t>
             </a:r>
             <a:r>
               <a:rPr lang="en-US" sz="2800" dirty="0">
@@ -17159,7 +17159,7 @@
               <a:rPr lang="en-US" sz="2800" dirty="0" err="1">
                 <a:latin typeface="Century Gothic" panose="020B0502020202020204" pitchFamily="34" charset="0"/>
               </a:rPr>
-              <a:t>EXERCISES.md</a:t>
+              <a:t>EXERCISES.pdf</a:t>
             </a:r>
             <a:r>
               <a:rPr lang="en-US" sz="2800" dirty="0">
@@ -23040,7 +23040,7 @@
               <a:rPr lang="en-US" sz="2800" dirty="0" err="1">
                 <a:latin typeface="Century Gothic" panose="020B0502020202020204" pitchFamily="34" charset="0"/>
               </a:rPr>
-              <a:t>EXERCISES.md</a:t>
+              <a:t>EXERCISES.pdf</a:t>
             </a:r>
             <a:r>
               <a:rPr lang="en-US" sz="2800" dirty="0">
@@ -26525,7 +26525,13 @@
               <a:rPr lang="en-US" sz="2800" dirty="0" err="1">
                 <a:latin typeface="Century Gothic" panose="020B0502020202020204" pitchFamily="34" charset="0"/>
               </a:rPr>
-              <a:t>EXERCISES.md</a:t>
+              <a:t>EXERCISES.</a:t>
+            </a:r>
+            <a:r>
+              <a:rPr lang="en-US" dirty="0" err="1">
+                <a:latin typeface="Century Gothic" panose="020B0502020202020204" pitchFamily="34" charset="0"/>
+              </a:rPr>
+              <a:t>pdf</a:t>
             </a:r>
             <a:r>
               <a:rPr lang="en-US" sz="2800" dirty="0">
@@ -30357,15 +30363,6 @@
 </file>
 
 <file path=customXml/item1.xml><?xml version="1.0" encoding="utf-8"?>
-<?mso-contentType ?>
-<FormTemplates xmlns="http://schemas.microsoft.com/sharepoint/v3/contenttype/forms">
-  <Display>DocumentLibraryForm</Display>
-  <Edit>DocumentLibraryForm</Edit>
-  <New>DocumentLibraryForm</New>
-</FormTemplates>
-</file>
-
-<file path=customXml/item2.xml><?xml version="1.0" encoding="utf-8"?>
 <p:properties xmlns:p="http://schemas.microsoft.com/office/2006/metadata/properties" xmlns:xsi="http://www.w3.org/2001/XMLSchema-instance" xmlns:pc="http://schemas.microsoft.com/office/infopath/2007/PartnerControls">
   <documentManagement>
     <TaxCatchAll xmlns="92c16b9d-8c83-445e-a4f4-1fe3d2f43f13" xsi:nil="true"/>
@@ -30376,7 +30373,7 @@
 </p:properties>
 </file>
 
-<file path=customXml/item3.xml><?xml version="1.0" encoding="utf-8"?>
+<file path=customXml/item2.xml><?xml version="1.0" encoding="utf-8"?>
 <ct:contentTypeSchema xmlns:ct="http://schemas.microsoft.com/office/2006/metadata/contentType" xmlns:ma="http://schemas.microsoft.com/office/2006/metadata/properties/metaAttributes" ct:_="" ma:_="" ma:contentTypeName="Document" ma:contentTypeID="0x010100DC7320DB280744439FF1CC777D09ECA4" ma:contentTypeVersion="15" ma:contentTypeDescription="Create a new document." ma:contentTypeScope="" ma:versionID="e50b92032c956cc777cf00ac7d475189">
   <xsd:schema xmlns:xsd="http://www.w3.org/2001/XMLSchema" xmlns:xs="http://www.w3.org/2001/XMLSchema" xmlns:p="http://schemas.microsoft.com/office/2006/metadata/properties" xmlns:ns2="7e49f7d3-8802-46ca-9604-495ce27f67f4" xmlns:ns3="a1519f9a-9d6a-41c1-afc9-552e4069f82f" xmlns:ns4="92c16b9d-8c83-445e-a4f4-1fe3d2f43f13" targetNamespace="http://schemas.microsoft.com/office/2006/metadata/properties" ma:root="true" ma:fieldsID="fcd7cab68a23f1df7b42ced4f3edf141" ns2:_="" ns3:_="" ns4:_="">
     <xsd:import namespace="7e49f7d3-8802-46ca-9604-495ce27f67f4"/>
@@ -30618,15 +30615,16 @@
 </ct:contentTypeSchema>
 </file>
 
-<file path=customXml/itemProps1.xml><?xml version="1.0" encoding="utf-8"?>
-<ds:datastoreItem xmlns:ds="http://schemas.openxmlformats.org/officeDocument/2006/customXml" ds:itemID="{06B4C708-AA43-4CE7-BE2D-F9D9A02F4940}">
-  <ds:schemaRefs>
-    <ds:schemaRef ds:uri="http://schemas.microsoft.com/sharepoint/v3/contenttype/forms"/>
-  </ds:schemaRefs>
-</ds:datastoreItem>
+<file path=customXml/item3.xml><?xml version="1.0" encoding="utf-8"?>
+<?mso-contentType ?>
+<FormTemplates xmlns="http://schemas.microsoft.com/sharepoint/v3/contenttype/forms">
+  <Display>DocumentLibraryForm</Display>
+  <Edit>DocumentLibraryForm</Edit>
+  <New>DocumentLibraryForm</New>
+</FormTemplates>
 </file>
 
-<file path=customXml/itemProps2.xml><?xml version="1.0" encoding="utf-8"?>
+<file path=customXml/itemProps1.xml><?xml version="1.0" encoding="utf-8"?>
 <ds:datastoreItem xmlns:ds="http://schemas.openxmlformats.org/officeDocument/2006/customXml" ds:itemID="{4AB02FF4-25A1-49FE-9DF7-DD19F525B7FA}">
   <ds:schemaRefs>
     <ds:schemaRef ds:uri="7e49f7d3-8802-46ca-9604-495ce27f67f4"/>
@@ -30644,7 +30642,7 @@
 </ds:datastoreItem>
 </file>
 
-<file path=customXml/itemProps3.xml><?xml version="1.0" encoding="utf-8"?>
+<file path=customXml/itemProps2.xml><?xml version="1.0" encoding="utf-8"?>
 <ds:datastoreItem xmlns:ds="http://schemas.openxmlformats.org/officeDocument/2006/customXml" ds:itemID="{6BBC22CE-40EC-4545-8FE9-90326628051D}">
   <ds:schemaRefs>
     <ds:schemaRef ds:uri="7e49f7d3-8802-46ca-9604-495ce27f67f4"/>
@@ -30662,4 +30660,12 @@
     <ds:schemaRef ds:uri="http://www.w3.org/2001/XMLSchema"/>
   </ds:schemaRefs>
 </ds:datastoreItem>
+</file>
+
+<file path=customXml/itemProps3.xml><?xml version="1.0" encoding="utf-8"?>
+<ds:datastoreItem xmlns:ds="http://schemas.openxmlformats.org/officeDocument/2006/customXml" ds:itemID="{06B4C708-AA43-4CE7-BE2D-F9D9A02F4940}">
+  <ds:schemaRefs>
+    <ds:schemaRef ds:uri="http://schemas.microsoft.com/sharepoint/v3/contenttype/forms"/>
+  </ds:schemaRefs>
+</ds:datastoreItem>
 </file>
</xml_diff>

<commit_message>
Minor installing_software clarity tweaks
</commit_message>
<xml_diff>
--- a/installing_software/installing_software.pptx
+++ b/installing_software/installing_software.pptx
@@ -653,7 +653,7 @@
           <a:bodyPr/>
           <a:lstStyle/>
           <a:p>
-            <a:endParaRPr lang="en-US"/>
+            <a:endParaRPr lang="en-US" dirty="0"/>
           </a:p>
         </p:txBody>
       </p:sp>
@@ -738,16 +738,16 @@
           <a:lstStyle/>
           <a:p>
             <a:r>
-              <a:rPr lang="en-US"/>
+              <a:rPr lang="en-US" dirty="0"/>
               <a:t>Okay, so let’s say you want to use a third-party software that isn’t available as a module. What do you do? You have to build your own software!</a:t>
             </a:r>
           </a:p>
           <a:p>
-            <a:endParaRPr lang="en-US"/>
-          </a:p>
-          <a:p>
-            <a:r>
-              <a:rPr lang="en-US"/>
+            <a:endParaRPr lang="en-US" dirty="0"/>
+          </a:p>
+          <a:p>
+            <a:r>
+              <a:rPr lang="en-US" dirty="0"/>
               <a:t>Let’s get some definitions out of the way.</a:t>
             </a:r>
           </a:p>
@@ -4187,20 +4187,20 @@
           <a:lstStyle/>
           <a:p>
             <a:r>
-              <a:rPr lang="en-US"/>
+              <a:rPr lang="en-US" dirty="0"/>
               <a:t>Here we are loading different versions of the HDF5 library. They are different in that they were compiled with different compilers, so we want our environment variables to reflect that. It would be a total pain if we had to do that manually, but luckily the </a:t>
             </a:r>
             <a:r>
-              <a:rPr lang="en-US" err="1"/>
+              <a:rPr lang="en-US" dirty="0" err="1"/>
               <a:t>lmod</a:t>
             </a:r>
             <a:r>
-              <a:rPr lang="en-US"/>
+              <a:rPr lang="en-US" dirty="0"/>
               <a:t> module system does that for us.</a:t>
             </a:r>
           </a:p>
           <a:p>
-            <a:endParaRPr lang="en-US"/>
+            <a:endParaRPr lang="en-US" dirty="0"/>
           </a:p>
         </p:txBody>
       </p:sp>
@@ -6179,7 +6179,25 @@
                 </a:solidFill>
                 <a:latin typeface="Century Gothic" panose="020B0502020202020204" pitchFamily="34" charset="0"/>
               </a:rPr>
-              <a:t>Take home: pay attention to what modules you are loading, as this may be important for reproducibility!</a:t>
+              <a:t>Take home: pay attention to </a:t>
+            </a:r>
+            <a:r>
+              <a:rPr lang="en-US" sz="3200" b="1">
+                <a:solidFill>
+                  <a:srgbClr val="FF0000"/>
+                </a:solidFill>
+                <a:latin typeface="Century Gothic" panose="020B0502020202020204" pitchFamily="34" charset="0"/>
+              </a:rPr>
+              <a:t>what software modules </a:t>
+            </a:r>
+            <a:r>
+              <a:rPr lang="en-US" sz="3200" b="1" dirty="0">
+                <a:solidFill>
+                  <a:srgbClr val="FF0000"/>
+                </a:solidFill>
+                <a:latin typeface="Century Gothic" panose="020B0502020202020204" pitchFamily="34" charset="0"/>
+              </a:rPr>
+              <a:t>you are loading, as this may be important for reproducibility!</a:t>
             </a:r>
             <a:endParaRPr lang="en-US" sz="2800" b="1" dirty="0">
               <a:solidFill>
@@ -25954,7 +25972,7 @@
           <a:lstStyle/>
           <a:p>
             <a:r>
-              <a:rPr lang="en-US" b="1">
+              <a:rPr lang="en-US" b="1" dirty="0">
                 <a:latin typeface="Century Gothic" panose="020B0502020202020204" pitchFamily="34" charset="0"/>
               </a:rPr>
               <a:t>The Module System </a:t>
@@ -27221,7 +27239,7 @@
                 <a:ea typeface="Helvetica Neue" panose="02000503000000020004" pitchFamily="2" charset="0"/>
                 <a:cs typeface="Helvetica Neue" panose="02000503000000020004" pitchFamily="2" charset="0"/>
               </a:rPr>
-              <a:t>: Loading and unloading modules will dynamically change the software environment on the cluster.</a:t>
+              <a:t>: Loading and unloading software modules will dynamically change the software environment on the cluster.</a:t>
             </a:r>
           </a:p>
           <a:p>
@@ -27746,7 +27764,7 @@
                 <a:ea typeface="Helvetica Neue" panose="02000503000000020004" pitchFamily="2" charset="0"/>
                 <a:cs typeface="Helvetica Neue" panose="02000503000000020004" pitchFamily="2" charset="0"/>
               </a:rPr>
-              <a:t>: Loading and unloading modules will set (and reset) important environment variables for you.</a:t>
+              <a:t>: Loading and unloading software modules will set (and reset) important environment variables for you.</a:t>
             </a:r>
           </a:p>
           <a:p>
@@ -28695,26 +28713,6 @@
 </file>
 
 <file path=customXml/item1.xml><?xml version="1.0" encoding="utf-8"?>
-<?mso-contentType ?>
-<FormTemplates xmlns="http://schemas.microsoft.com/sharepoint/v3/contenttype/forms">
-  <Display>DocumentLibraryForm</Display>
-  <Edit>DocumentLibraryForm</Edit>
-  <New>DocumentLibraryForm</New>
-</FormTemplates>
-</file>
-
-<file path=customXml/item2.xml><?xml version="1.0" encoding="utf-8"?>
-<p:properties xmlns:p="http://schemas.microsoft.com/office/2006/metadata/properties" xmlns:xsi="http://www.w3.org/2001/XMLSchema-instance" xmlns:pc="http://schemas.microsoft.com/office/infopath/2007/PartnerControls">
-  <documentManagement>
-    <TaxCatchAll xmlns="92c16b9d-8c83-445e-a4f4-1fe3d2f43f13" xsi:nil="true"/>
-    <lcf76f155ced4ddcb4097134ff3c332f xmlns="7e49f7d3-8802-46ca-9604-495ce27f67f4">
-      <Terms xmlns="http://schemas.microsoft.com/office/infopath/2007/PartnerControls"/>
-    </lcf76f155ced4ddcb4097134ff3c332f>
-  </documentManagement>
-</p:properties>
-</file>
-
-<file path=customXml/item3.xml><?xml version="1.0" encoding="utf-8"?>
 <ct:contentTypeSchema xmlns:ct="http://schemas.microsoft.com/office/2006/metadata/contentType" xmlns:ma="http://schemas.microsoft.com/office/2006/metadata/properties/metaAttributes" ct:_="" ma:_="" ma:contentTypeName="Document" ma:contentTypeID="0x010100DC7320DB280744439FF1CC777D09ECA4" ma:contentTypeVersion="15" ma:contentTypeDescription="Create a new document." ma:contentTypeScope="" ma:versionID="e50b92032c956cc777cf00ac7d475189">
   <xsd:schema xmlns:xsd="http://www.w3.org/2001/XMLSchema" xmlns:xs="http://www.w3.org/2001/XMLSchema" xmlns:p="http://schemas.microsoft.com/office/2006/metadata/properties" xmlns:ns2="7e49f7d3-8802-46ca-9604-495ce27f67f4" xmlns:ns3="a1519f9a-9d6a-41c1-afc9-552e4069f82f" xmlns:ns4="92c16b9d-8c83-445e-a4f4-1fe3d2f43f13" targetNamespace="http://schemas.microsoft.com/office/2006/metadata/properties" ma:root="true" ma:fieldsID="fcd7cab68a23f1df7b42ced4f3edf141" ns2:_="" ns3:_="" ns4:_="">
     <xsd:import namespace="7e49f7d3-8802-46ca-9604-495ce27f67f4"/>
@@ -28956,33 +28954,27 @@
 </ct:contentTypeSchema>
 </file>
 
-<file path=customXml/itemProps1.xml><?xml version="1.0" encoding="utf-8"?>
-<ds:datastoreItem xmlns:ds="http://schemas.openxmlformats.org/officeDocument/2006/customXml" ds:itemID="{06B4C708-AA43-4CE7-BE2D-F9D9A02F4940}">
-  <ds:schemaRefs>
-    <ds:schemaRef ds:uri="http://schemas.microsoft.com/sharepoint/v3/contenttype/forms"/>
-  </ds:schemaRefs>
-</ds:datastoreItem>
+<file path=customXml/item2.xml><?xml version="1.0" encoding="utf-8"?>
+<?mso-contentType ?>
+<FormTemplates xmlns="http://schemas.microsoft.com/sharepoint/v3/contenttype/forms">
+  <Display>DocumentLibraryForm</Display>
+  <Edit>DocumentLibraryForm</Edit>
+  <New>DocumentLibraryForm</New>
+</FormTemplates>
 </file>
 
-<file path=customXml/itemProps2.xml><?xml version="1.0" encoding="utf-8"?>
-<ds:datastoreItem xmlns:ds="http://schemas.openxmlformats.org/officeDocument/2006/customXml" ds:itemID="{4AB02FF4-25A1-49FE-9DF7-DD19F525B7FA}">
-  <ds:schemaRefs>
-    <ds:schemaRef ds:uri="7e49f7d3-8802-46ca-9604-495ce27f67f4"/>
-    <ds:schemaRef ds:uri="92c16b9d-8c83-445e-a4f4-1fe3d2f43f13"/>
-    <ds:schemaRef ds:uri="a1519f9a-9d6a-41c1-afc9-552e4069f82f"/>
-    <ds:schemaRef ds:uri="http://purl.org/dc/dcmitype/"/>
-    <ds:schemaRef ds:uri="http://purl.org/dc/elements/1.1/"/>
-    <ds:schemaRef ds:uri="http://purl.org/dc/terms/"/>
-    <ds:schemaRef ds:uri="http://schemas.microsoft.com/office/2006/documentManagement/types"/>
-    <ds:schemaRef ds:uri="http://schemas.microsoft.com/office/2006/metadata/properties"/>
-    <ds:schemaRef ds:uri="http://schemas.microsoft.com/office/infopath/2007/PartnerControls"/>
-    <ds:schemaRef ds:uri="http://schemas.openxmlformats.org/package/2006/metadata/core-properties"/>
-    <ds:schemaRef ds:uri="http://www.w3.org/XML/1998/namespace"/>
-  </ds:schemaRefs>
-</ds:datastoreItem>
+<file path=customXml/item3.xml><?xml version="1.0" encoding="utf-8"?>
+<p:properties xmlns:p="http://schemas.microsoft.com/office/2006/metadata/properties" xmlns:xsi="http://www.w3.org/2001/XMLSchema-instance" xmlns:pc="http://schemas.microsoft.com/office/infopath/2007/PartnerControls">
+  <documentManagement>
+    <TaxCatchAll xmlns="92c16b9d-8c83-445e-a4f4-1fe3d2f43f13" xsi:nil="true"/>
+    <lcf76f155ced4ddcb4097134ff3c332f xmlns="7e49f7d3-8802-46ca-9604-495ce27f67f4">
+      <Terms xmlns="http://schemas.microsoft.com/office/infopath/2007/PartnerControls"/>
+    </lcf76f155ced4ddcb4097134ff3c332f>
+  </documentManagement>
+</p:properties>
 </file>
 
-<file path=customXml/itemProps3.xml><?xml version="1.0" encoding="utf-8"?>
+<file path=customXml/itemProps1.xml><?xml version="1.0" encoding="utf-8"?>
 <ds:datastoreItem xmlns:ds="http://schemas.openxmlformats.org/officeDocument/2006/customXml" ds:itemID="{6BBC22CE-40EC-4545-8FE9-90326628051D}">
   <ds:schemaRefs>
     <ds:schemaRef ds:uri="7e49f7d3-8802-46ca-9604-495ce27f67f4"/>
@@ -29000,4 +28992,30 @@
     <ds:schemaRef ds:uri="http://www.w3.org/2001/XMLSchema"/>
   </ds:schemaRefs>
 </ds:datastoreItem>
+</file>
+
+<file path=customXml/itemProps2.xml><?xml version="1.0" encoding="utf-8"?>
+<ds:datastoreItem xmlns:ds="http://schemas.openxmlformats.org/officeDocument/2006/customXml" ds:itemID="{06B4C708-AA43-4CE7-BE2D-F9D9A02F4940}">
+  <ds:schemaRefs>
+    <ds:schemaRef ds:uri="http://schemas.microsoft.com/sharepoint/v3/contenttype/forms"/>
+  </ds:schemaRefs>
+</ds:datastoreItem>
+</file>
+
+<file path=customXml/itemProps3.xml><?xml version="1.0" encoding="utf-8"?>
+<ds:datastoreItem xmlns:ds="http://schemas.openxmlformats.org/officeDocument/2006/customXml" ds:itemID="{4AB02FF4-25A1-49FE-9DF7-DD19F525B7FA}">
+  <ds:schemaRefs>
+    <ds:schemaRef ds:uri="7e49f7d3-8802-46ca-9604-495ce27f67f4"/>
+    <ds:schemaRef ds:uri="92c16b9d-8c83-445e-a4f4-1fe3d2f43f13"/>
+    <ds:schemaRef ds:uri="a1519f9a-9d6a-41c1-afc9-552e4069f82f"/>
+    <ds:schemaRef ds:uri="http://purl.org/dc/dcmitype/"/>
+    <ds:schemaRef ds:uri="http://purl.org/dc/elements/1.1/"/>
+    <ds:schemaRef ds:uri="http://purl.org/dc/terms/"/>
+    <ds:schemaRef ds:uri="http://schemas.microsoft.com/office/2006/documentManagement/types"/>
+    <ds:schemaRef ds:uri="http://schemas.microsoft.com/office/2006/metadata/properties"/>
+    <ds:schemaRef ds:uri="http://schemas.microsoft.com/office/infopath/2007/PartnerControls"/>
+    <ds:schemaRef ds:uri="http://schemas.openxmlformats.org/package/2006/metadata/core-properties"/>
+    <ds:schemaRef ds:uri="http://www.w3.org/XML/1998/namespace"/>
+  </ds:schemaRefs>
+</ds:datastoreItem>
 </file>
</xml_diff>

<commit_message>
Content and accessibility fixes for slides
</commit_message>
<xml_diff>
--- a/installing_software/installing_software.pptx
+++ b/installing_software/installing_software.pptx
@@ -5305,7 +5305,7 @@
           <a:p>
             <a:r>
               <a:rPr lang="en-US" dirty="0"/>
-              <a:t>Finding, downloading, and applying software on CURC resources</a:t>
+              <a:t>Finding, Downloading, and Applying Software on CURC Resources</a:t>
             </a:r>
             <a:br>
               <a:rPr lang="en-US" dirty="0"/>
@@ -5953,7 +5953,7 @@
                   <a:ea typeface="Helvetica Neue" panose="02000503000000020004" pitchFamily="2" charset="0"/>
                   <a:cs typeface="Courier New" panose="02070309020205020404" pitchFamily="49" charset="0"/>
                 </a:rPr>
-                <a:t>module spider &lt;package&gt;			# view info for all version</a:t>
+                <a:t>module spider &lt;package&gt;			# view info for all versions</a:t>
               </a:r>
             </a:p>
             <a:p>
@@ -6179,25 +6179,7 @@
                 </a:solidFill>
                 <a:latin typeface="Century Gothic" panose="020B0502020202020204" pitchFamily="34" charset="0"/>
               </a:rPr>
-              <a:t>Take home: pay attention to </a:t>
-            </a:r>
-            <a:r>
-              <a:rPr lang="en-US" sz="3200" b="1">
-                <a:solidFill>
-                  <a:srgbClr val="FF0000"/>
-                </a:solidFill>
-                <a:latin typeface="Century Gothic" panose="020B0502020202020204" pitchFamily="34" charset="0"/>
-              </a:rPr>
-              <a:t>what software modules </a:t>
-            </a:r>
-            <a:r>
-              <a:rPr lang="en-US" sz="3200" b="1" dirty="0">
-                <a:solidFill>
-                  <a:srgbClr val="FF0000"/>
-                </a:solidFill>
-                <a:latin typeface="Century Gothic" panose="020B0502020202020204" pitchFamily="34" charset="0"/>
-              </a:rPr>
-              <a:t>you are loading, as this may be important for reproducibility!</a:t>
+              <a:t>Take home: pay attention to what software modules you are loading, as this may be important for reproducibility!</a:t>
             </a:r>
             <a:endParaRPr lang="en-US" sz="2800" b="1" dirty="0">
               <a:solidFill>
@@ -6498,7 +6480,7 @@
           <a:lstStyle/>
           <a:p>
             <a:r>
-              <a:rPr lang="en-US" sz="3200">
+              <a:rPr lang="en-US" sz="3200" dirty="0">
                 <a:latin typeface="Century Gothic" panose="020B0502020202020204" pitchFamily="34" charset="0"/>
               </a:rPr>
               <a:t>Definitions</a:t>
@@ -6507,43 +6489,43 @@
           <a:p>
             <a:pPr lvl="1"/>
             <a:r>
-              <a:rPr lang="en-US" sz="2800" b="1">
+              <a:rPr lang="en-US" sz="2800" b="1" dirty="0">
                 <a:latin typeface="Century Gothic" panose="020B0502020202020204" pitchFamily="34" charset="0"/>
               </a:rPr>
               <a:t>Building- </a:t>
             </a:r>
             <a:r>
-              <a:rPr lang="en-US" sz="2800">
+              <a:rPr lang="en-US" sz="2800" dirty="0">
                 <a:latin typeface="Century Gothic" panose="020B0502020202020204" pitchFamily="34" charset="0"/>
               </a:rPr>
               <a:t>a</a:t>
             </a:r>
             <a:r>
-              <a:rPr lang="en-US" sz="2800" b="1">
+              <a:rPr lang="en-US" sz="2800" b="1" dirty="0">
                 <a:latin typeface="Century Gothic" panose="020B0502020202020204" pitchFamily="34" charset="0"/>
               </a:rPr>
               <a:t> </a:t>
             </a:r>
             <a:r>
-              <a:rPr lang="en-US" sz="2800">
+              <a:rPr lang="en-US" sz="2800" dirty="0">
                 <a:latin typeface="Century Gothic" panose="020B0502020202020204" pitchFamily="34" charset="0"/>
               </a:rPr>
               <a:t>generic term describing the overall installation process that includes compiling</a:t>
             </a:r>
-            <a:endParaRPr lang="en-US" sz="2800" b="1">
+            <a:endParaRPr lang="en-US" sz="2800" b="1" dirty="0">
               <a:latin typeface="Century Gothic" panose="020B0502020202020204" pitchFamily="34" charset="0"/>
             </a:endParaRPr>
           </a:p>
           <a:p>
             <a:pPr lvl="1"/>
             <a:r>
-              <a:rPr lang="en-US" sz="2800" b="1">
+              <a:rPr lang="en-US" sz="2800" b="1" dirty="0">
                 <a:latin typeface="Century Gothic" panose="020B0502020202020204" pitchFamily="34" charset="0"/>
               </a:rPr>
               <a:t>Compiling</a:t>
             </a:r>
             <a:r>
-              <a:rPr lang="en-US" sz="2800">
+              <a:rPr lang="en-US" sz="2800" dirty="0">
                 <a:latin typeface="Century Gothic" panose="020B0502020202020204" pitchFamily="34" charset="0"/>
               </a:rPr>
               <a:t>- the process of converting source code to an executable</a:t>
@@ -6552,13 +6534,13 @@
           <a:p>
             <a:pPr lvl="1"/>
             <a:r>
-              <a:rPr lang="en-US" sz="2800" b="1">
+              <a:rPr lang="en-US" sz="2800" b="1" dirty="0">
                 <a:latin typeface="Century Gothic" panose="020B0502020202020204" pitchFamily="34" charset="0"/>
               </a:rPr>
               <a:t>Linking</a:t>
             </a:r>
             <a:r>
-              <a:rPr lang="en-US" sz="2800">
+              <a:rPr lang="en-US" sz="2800" dirty="0">
                 <a:latin typeface="Century Gothic" panose="020B0502020202020204" pitchFamily="34" charset="0"/>
               </a:rPr>
               <a:t>- the process of combining pieces of code and data into a single file that can be loaded into memory and executed</a:t>
@@ -6567,18 +6549,18 @@
           <a:p>
             <a:pPr lvl="1"/>
             <a:r>
-              <a:rPr lang="en-US" sz="2800" b="1">
+              <a:rPr lang="en-US" sz="2800" b="1" dirty="0">
                 <a:latin typeface="Century Gothic" panose="020B0502020202020204" pitchFamily="34" charset="0"/>
               </a:rPr>
               <a:t>Installing</a:t>
             </a:r>
             <a:r>
-              <a:rPr lang="en-US" sz="2800">
+              <a:rPr lang="en-US" sz="2800" dirty="0">
                 <a:latin typeface="Century Gothic" panose="020B0502020202020204" pitchFamily="34" charset="0"/>
               </a:rPr>
-              <a:t>- any process that results in executables</a:t>
-            </a:r>
-            <a:endParaRPr lang="en-US" sz="2800" b="1">
+              <a:t>- the process of preparing, configuring, and moving files to make software usable on a system</a:t>
+            </a:r>
+            <a:endParaRPr lang="en-US" sz="2800" b="1" dirty="0">
               <a:latin typeface="Century Gothic" panose="020B0502020202020204" pitchFamily="34" charset="0"/>
             </a:endParaRPr>
           </a:p>
@@ -6586,7 +6568,7 @@
             <a:pPr marL="457200" lvl="1" indent="0">
               <a:buNone/>
             </a:pPr>
-            <a:endParaRPr lang="en-US" sz="2800" b="1">
+            <a:endParaRPr lang="en-US" sz="2800" b="1" dirty="0">
               <a:latin typeface="Century Gothic" panose="020B0502020202020204" pitchFamily="34" charset="0"/>
             </a:endParaRPr>
           </a:p>
@@ -7440,7 +7422,7 @@
               <a:rPr lang="en-US" sz="3200" dirty="0">
                 <a:latin typeface="Century Gothic" panose="020B0502020202020204" pitchFamily="34" charset="0"/>
               </a:rPr>
-              <a:t>It is not distributed as a pre-compiled binary, by any package manager, and is not easily containerized.</a:t>
+              <a:t>If it is not distributed as a pre-compiled binary, by any package manager, and is not easily containerized.</a:t>
             </a:r>
           </a:p>
           <a:p>
@@ -7884,7 +7866,7 @@
                 <a:effectLst/>
                 <a:latin typeface="Century Gothic" panose="020B0502020202020204" pitchFamily="34" charset="0"/>
               </a:rPr>
-              <a:t>your application includes instructions to run </a:t>
+              <a:t>Used if your application includes instructions to run </a:t>
             </a:r>
             <a:r>
               <a:rPr lang="en-US" sz="2600" dirty="0">
@@ -8474,7 +8456,7 @@
               <a:rPr lang="en-US" sz="2400" dirty="0">
                 <a:latin typeface="Century Gothic" panose="020B0502020202020204" pitchFamily="34" charset="0"/>
               </a:rPr>
-              <a:t>your application includes a </a:t>
+              <a:t>Used if your application includes a </a:t>
             </a:r>
             <a:r>
               <a:rPr lang="en-US" sz="2400" dirty="0" err="1">
@@ -9422,6 +9404,13 @@
           <a:p>
             <a:pPr lvl="2"/>
             <a:r>
+              <a:rPr lang="en-US" sz="2400" dirty="0">
+                <a:latin typeface="Century Gothic" panose="020B0502020202020204" pitchFamily="34" charset="0"/>
+                <a:cs typeface="Courier New" panose="02070309020205020404" pitchFamily="49" charset="0"/>
+              </a:rPr>
+              <a:t>Use </a:t>
+            </a:r>
+            <a:r>
               <a:rPr lang="en-US" sz="2400" dirty="0" err="1">
                 <a:latin typeface="Courier New" panose="02070309020205020404" pitchFamily="49" charset="0"/>
                 <a:cs typeface="Courier New" panose="02070309020205020404" pitchFamily="49" charset="0"/>
@@ -9819,7 +9808,7 @@
         </p:nvSpPr>
         <p:spPr>
           <a:xfrm>
-            <a:off x="561975" y="1661232"/>
+            <a:off x="838200" y="1690688"/>
             <a:ext cx="6410325" cy="3920418"/>
           </a:xfrm>
         </p:spPr>
@@ -9984,7 +9973,7 @@
               <a:buNone/>
             </a:pPr>
             <a:r>
-              <a:rPr lang="en-US" sz="3200">
+              <a:rPr lang="en-US" sz="3200" dirty="0">
                 <a:latin typeface="Century Gothic" panose="020B0502020202020204" pitchFamily="34" charset="0"/>
               </a:rPr>
               <a:t>Conventions and best practices</a:t>
@@ -9993,7 +9982,7 @@
           <a:p>
             <a:pPr lvl="1"/>
             <a:r>
-              <a:rPr lang="en-US" sz="2900">
+              <a:rPr lang="en-US" sz="2900" dirty="0">
                 <a:latin typeface="Century Gothic" panose="020B0502020202020204" pitchFamily="34" charset="0"/>
               </a:rPr>
               <a:t>Make life easier for yourself by adding executables to PATH and any directories with libraries that your application links to LD_LIBRARY_PATH</a:t>
@@ -10003,7 +9992,7 @@
             <a:pPr marL="457200" lvl="1" indent="0">
               <a:buNone/>
             </a:pPr>
-            <a:endParaRPr lang="en-US" sz="2800">
+            <a:endParaRPr lang="en-US" sz="2800" dirty="0">
               <a:latin typeface="Century Gothic" panose="020B0502020202020204" pitchFamily="34" charset="0"/>
             </a:endParaRPr>
           </a:p>
@@ -10749,7 +10738,7 @@
         </p:nvSpPr>
         <p:spPr>
           <a:xfrm>
-            <a:off x="523407" y="359852"/>
+            <a:off x="354992" y="359850"/>
             <a:ext cx="10515600" cy="1325563"/>
           </a:xfrm>
         </p:spPr>
@@ -10762,6 +10751,15 @@
                 <a:latin typeface="Century Gothic"/>
               </a:rPr>
               <a:t>Simplifying Installations with</a:t>
+            </a:r>
+            <a:r>
+              <a:rPr lang="en-US" b="1" dirty="0">
+                <a:solidFill>
+                  <a:schemeClr val="bg1"/>
+                </a:solidFill>
+                <a:latin typeface="Century Gothic"/>
+              </a:rPr>
+              <a:t> Spack</a:t>
             </a:r>
           </a:p>
         </p:txBody>
@@ -10788,7 +10786,7 @@
         </p:blipFill>
         <p:spPr>
           <a:xfrm>
-            <a:off x="8199709" y="500682"/>
+            <a:off x="8212066" y="359850"/>
             <a:ext cx="3624942" cy="1043901"/>
           </a:xfrm>
           <a:prstGeom prst="rect">
@@ -11147,8 +11145,8 @@
         </p:nvSpPr>
         <p:spPr>
           <a:xfrm>
-            <a:off x="-258896" y="365125"/>
-            <a:ext cx="8595176" cy="1348423"/>
+            <a:off x="-466727" y="203389"/>
+            <a:ext cx="11046345" cy="1348423"/>
           </a:xfrm>
         </p:spPr>
         <p:txBody>
@@ -11162,7 +11160,20 @@
               </a:rPr>
               <a:t>Simplifying Installations with</a:t>
             </a:r>
-            <a:endParaRPr lang="en-US" dirty="0"/>
+            <a:r>
+              <a:rPr lang="en-US" b="1" dirty="0">
+                <a:solidFill>
+                  <a:schemeClr val="bg1"/>
+                </a:solidFill>
+                <a:latin typeface="Century Gothic"/>
+              </a:rPr>
+              <a:t> Spack</a:t>
+            </a:r>
+            <a:endParaRPr lang="en-US" dirty="0">
+              <a:solidFill>
+                <a:schemeClr val="bg1"/>
+              </a:solidFill>
+            </a:endParaRPr>
           </a:p>
         </p:txBody>
       </p:sp>
@@ -11188,7 +11199,7 @@
         </p:blipFill>
         <p:spPr>
           <a:xfrm>
-            <a:off x="7973248" y="516545"/>
+            <a:off x="8214945" y="329564"/>
             <a:ext cx="3624942" cy="1043901"/>
           </a:xfrm>
           <a:prstGeom prst="rect">
@@ -12089,7 +12100,7 @@
         </p:nvSpPr>
         <p:spPr>
           <a:xfrm>
-            <a:off x="178841" y="365125"/>
+            <a:off x="234892" y="256097"/>
             <a:ext cx="11174959" cy="1340803"/>
           </a:xfrm>
         </p:spPr>
@@ -12105,7 +12116,22 @@
               </a:rPr>
               <a:t>Simplifying Installations with</a:t>
             </a:r>
-            <a:endParaRPr lang="en-US" dirty="0"/>
+            <a:r>
+              <a:rPr lang="en-US" b="1" dirty="0">
+                <a:solidFill>
+                  <a:schemeClr val="bg1"/>
+                </a:solidFill>
+                <a:latin typeface="Century Gothic"/>
+                <a:ea typeface="+mj-lt"/>
+                <a:cs typeface="+mj-lt"/>
+              </a:rPr>
+              <a:t> Spack</a:t>
+            </a:r>
+            <a:endParaRPr lang="en-US" dirty="0">
+              <a:solidFill>
+                <a:schemeClr val="bg1"/>
+              </a:solidFill>
+            </a:endParaRPr>
           </a:p>
         </p:txBody>
       </p:sp>
@@ -12131,7 +12157,7 @@
         </p:blipFill>
         <p:spPr>
           <a:xfrm>
-            <a:off x="7820297" y="508925"/>
+            <a:off x="8169729" y="404547"/>
             <a:ext cx="3624942" cy="1043901"/>
           </a:xfrm>
           <a:prstGeom prst="rect">
@@ -12496,7 +12522,7 @@
         </p:nvSpPr>
         <p:spPr>
           <a:xfrm>
-            <a:off x="358967" y="365125"/>
+            <a:off x="398294" y="360473"/>
             <a:ext cx="10994833" cy="1340803"/>
           </a:xfrm>
         </p:spPr>
@@ -12505,12 +12531,27 @@
           <a:lstStyle/>
           <a:p>
             <a:r>
-              <a:rPr lang="en-US" b="1">
+              <a:rPr lang="en-US" b="1" dirty="0">
                 <a:latin typeface="Century Gothic"/>
               </a:rPr>
-              <a:t>Simplifying Installations with </a:t>
-            </a:r>
-            <a:endParaRPr lang="en-US"/>
+              <a:t>Simplifying Installations with</a:t>
+            </a:r>
+            <a:r>
+              <a:rPr lang="en-US" b="1" dirty="0">
+                <a:solidFill>
+                  <a:schemeClr val="bg1"/>
+                </a:solidFill>
+                <a:latin typeface="Century Gothic"/>
+              </a:rPr>
+              <a:t> Spack</a:t>
+            </a:r>
+            <a:r>
+              <a:rPr lang="en-US" b="1" dirty="0">
+                <a:latin typeface="Century Gothic"/>
+              </a:rPr>
+              <a:t> </a:t>
+            </a:r>
+            <a:endParaRPr lang="en-US" dirty="0"/>
           </a:p>
         </p:txBody>
       </p:sp>
@@ -12536,7 +12577,7 @@
         </p:blipFill>
         <p:spPr>
           <a:xfrm>
-            <a:off x="7995557" y="508925"/>
+            <a:off x="8168764" y="498439"/>
             <a:ext cx="3624942" cy="1043901"/>
           </a:xfrm>
           <a:prstGeom prst="rect">
@@ -13456,12 +13497,27 @@
           <a:lstStyle/>
           <a:p>
             <a:r>
-              <a:rPr lang="en-US" b="1">
+              <a:rPr lang="en-US" b="1" dirty="0">
                 <a:latin typeface="Century Gothic"/>
               </a:rPr>
-              <a:t>Simplifying Installations with </a:t>
-            </a:r>
-            <a:endParaRPr lang="en-US"/>
+              <a:t>Simplifying Installations with</a:t>
+            </a:r>
+            <a:r>
+              <a:rPr lang="en-US" b="1" dirty="0">
+                <a:solidFill>
+                  <a:schemeClr val="bg1"/>
+                </a:solidFill>
+                <a:latin typeface="Century Gothic"/>
+              </a:rPr>
+              <a:t> Spack</a:t>
+            </a:r>
+            <a:r>
+              <a:rPr lang="en-US" b="1" dirty="0">
+                <a:latin typeface="Century Gothic"/>
+              </a:rPr>
+              <a:t> </a:t>
+            </a:r>
+            <a:endParaRPr lang="en-US" dirty="0"/>
           </a:p>
         </p:txBody>
       </p:sp>
@@ -13487,7 +13543,7 @@
         </p:blipFill>
         <p:spPr>
           <a:xfrm>
-            <a:off x="7995557" y="508925"/>
+            <a:off x="8169729" y="513575"/>
             <a:ext cx="3624942" cy="1043901"/>
           </a:xfrm>
           <a:prstGeom prst="rect">
@@ -14342,16 +14398,30 @@
             <p:ph type="title"/>
           </p:nvPr>
         </p:nvSpPr>
-        <p:spPr/>
+        <p:spPr>
+          <a:xfrm>
+            <a:off x="529282" y="359852"/>
+            <a:ext cx="10515600" cy="1325563"/>
+          </a:xfrm>
+        </p:spPr>
         <p:txBody>
           <a:bodyPr/>
           <a:lstStyle/>
           <a:p>
             <a:r>
-              <a:rPr lang="en-US" b="1">
+              <a:rPr lang="en-US" b="1" dirty="0">
                 <a:latin typeface="Century Gothic"/>
               </a:rPr>
               <a:t>Simplifying Installations with</a:t>
+            </a:r>
+            <a:r>
+              <a:rPr lang="en-US" b="1" dirty="0">
+                <a:solidFill>
+                  <a:schemeClr val="bg1"/>
+                </a:solidFill>
+                <a:latin typeface="Century Gothic"/>
+              </a:rPr>
+              <a:t> Spack</a:t>
             </a:r>
           </a:p>
         </p:txBody>
@@ -14378,7 +14448,7 @@
         </p:blipFill>
         <p:spPr>
           <a:xfrm>
-            <a:off x="8567057" y="501305"/>
+            <a:off x="8394063" y="500682"/>
             <a:ext cx="3624942" cy="1043901"/>
           </a:xfrm>
           <a:prstGeom prst="rect">
@@ -14673,7 +14743,7 @@
         </p:nvSpPr>
         <p:spPr>
           <a:xfrm>
-            <a:off x="334545" y="365125"/>
+            <a:off x="334545" y="237098"/>
             <a:ext cx="11019255" cy="1340803"/>
           </a:xfrm>
         </p:spPr>
@@ -14687,7 +14757,20 @@
               </a:rPr>
               <a:t>Simplifying Installations with</a:t>
             </a:r>
-            <a:endParaRPr lang="en-US" dirty="0"/>
+            <a:r>
+              <a:rPr lang="en-US" b="1" dirty="0">
+                <a:solidFill>
+                  <a:schemeClr val="bg1"/>
+                </a:solidFill>
+                <a:latin typeface="Century Gothic"/>
+              </a:rPr>
+              <a:t> Spack</a:t>
+            </a:r>
+            <a:endParaRPr lang="en-US" dirty="0">
+              <a:solidFill>
+                <a:schemeClr val="bg1"/>
+              </a:solidFill>
+            </a:endParaRPr>
           </a:p>
         </p:txBody>
       </p:sp>
@@ -14713,7 +14796,7 @@
         </p:blipFill>
         <p:spPr>
           <a:xfrm>
-            <a:off x="7949837" y="508925"/>
+            <a:off x="8169729" y="360256"/>
             <a:ext cx="3624942" cy="1043901"/>
           </a:xfrm>
           <a:prstGeom prst="rect">
@@ -15359,7 +15442,7 @@
         </p:nvSpPr>
         <p:spPr>
           <a:xfrm>
-            <a:off x="416805" y="365125"/>
+            <a:off x="568166" y="360473"/>
             <a:ext cx="10936995" cy="1340803"/>
           </a:xfrm>
         </p:spPr>
@@ -15373,7 +15456,20 @@
               </a:rPr>
               <a:t>Simplifying Installations with</a:t>
             </a:r>
-            <a:endParaRPr lang="en-US" dirty="0"/>
+            <a:r>
+              <a:rPr lang="en-US" b="1" dirty="0">
+                <a:solidFill>
+                  <a:schemeClr val="bg1"/>
+                </a:solidFill>
+                <a:latin typeface="Century Gothic"/>
+              </a:rPr>
+              <a:t> Spack</a:t>
+            </a:r>
+            <a:endParaRPr lang="en-US" dirty="0">
+              <a:solidFill>
+                <a:schemeClr val="bg1"/>
+              </a:solidFill>
+            </a:endParaRPr>
           </a:p>
         </p:txBody>
       </p:sp>
@@ -15399,7 +15495,7 @@
         </p:blipFill>
         <p:spPr>
           <a:xfrm>
-            <a:off x="7995557" y="508925"/>
+            <a:off x="8353903" y="466697"/>
             <a:ext cx="3624942" cy="1043901"/>
           </a:xfrm>
           <a:prstGeom prst="rect">
@@ -16450,7 +16546,8 @@
             </a:r>
             <a:r>
               <a:rPr lang="en-US" sz="2800" dirty="0" err="1">
-                <a:latin typeface="Century Gothic"/>
+                <a:latin typeface="Courier New" panose="02070309020205020404" pitchFamily="49" charset="0"/>
+                <a:cs typeface="Courier New" panose="02070309020205020404" pitchFamily="49" charset="0"/>
               </a:rPr>
               <a:t>fastqc</a:t>
             </a:r>
@@ -16596,7 +16693,12 @@
             <p:ph type="title"/>
           </p:nvPr>
         </p:nvSpPr>
-        <p:spPr/>
+        <p:spPr>
+          <a:xfrm>
+            <a:off x="553995" y="365123"/>
+            <a:ext cx="10515600" cy="1325563"/>
+          </a:xfrm>
+        </p:spPr>
         <p:txBody>
           <a:bodyPr/>
           <a:lstStyle/>
@@ -16607,6 +16709,30 @@
               </a:rPr>
               <a:t>Virtual Environments with</a:t>
             </a:r>
+            <a:r>
+              <a:rPr lang="en-US" b="1" dirty="0">
+                <a:solidFill>
+                  <a:schemeClr val="bg1"/>
+                </a:solidFill>
+                <a:latin typeface="Century Gothic" panose="020B0502020202020204" pitchFamily="34" charset="0"/>
+              </a:rPr>
+              <a:t> </a:t>
+            </a:r>
+            <a:r>
+              <a:rPr lang="en-US" b="1" dirty="0" err="1">
+                <a:solidFill>
+                  <a:schemeClr val="bg1"/>
+                </a:solidFill>
+                <a:latin typeface="Century Gothic" panose="020B0502020202020204" pitchFamily="34" charset="0"/>
+              </a:rPr>
+              <a:t>Conda</a:t>
+            </a:r>
+            <a:endParaRPr lang="en-US" b="1" dirty="0">
+              <a:solidFill>
+                <a:schemeClr val="bg1"/>
+              </a:solidFill>
+              <a:latin typeface="Century Gothic" panose="020B0502020202020204" pitchFamily="34" charset="0"/>
+            </a:endParaRPr>
           </a:p>
         </p:txBody>
       </p:sp>
@@ -16632,7 +16758,7 @@
         </p:blipFill>
         <p:spPr>
           <a:xfrm>
-            <a:off x="7678028" y="439562"/>
+            <a:off x="7480320" y="365123"/>
             <a:ext cx="4272920" cy="1176687"/>
           </a:xfrm>
           <a:prstGeom prst="rect">
@@ -16968,7 +17094,7 @@
         </p:nvSpPr>
         <p:spPr>
           <a:xfrm>
-            <a:off x="838200" y="18255"/>
+            <a:off x="838200" y="106021"/>
             <a:ext cx="10515600" cy="1325563"/>
           </a:xfrm>
         </p:spPr>
@@ -16982,7 +17108,29 @@
               </a:rPr>
               <a:t>Virtual Environments with</a:t>
             </a:r>
-            <a:endParaRPr lang="en-US" dirty="0"/>
+            <a:r>
+              <a:rPr lang="en-US" b="1" dirty="0">
+                <a:solidFill>
+                  <a:schemeClr val="bg1"/>
+                </a:solidFill>
+                <a:latin typeface="Century Gothic" panose="020B0502020202020204" pitchFamily="34" charset="0"/>
+              </a:rPr>
+              <a:t> </a:t>
+            </a:r>
+            <a:r>
+              <a:rPr lang="en-US" b="1" dirty="0" err="1">
+                <a:solidFill>
+                  <a:schemeClr val="bg1"/>
+                </a:solidFill>
+                <a:latin typeface="Century Gothic" panose="020B0502020202020204" pitchFamily="34" charset="0"/>
+              </a:rPr>
+              <a:t>Conda</a:t>
+            </a:r>
+            <a:endParaRPr lang="en-US" dirty="0">
+              <a:solidFill>
+                <a:schemeClr val="bg1"/>
+              </a:solidFill>
+            </a:endParaRPr>
           </a:p>
         </p:txBody>
       </p:sp>
@@ -17578,6 +17726,30 @@
               </a:rPr>
               <a:t>Virtual Environments with</a:t>
             </a:r>
+            <a:r>
+              <a:rPr lang="en-US" b="1" dirty="0">
+                <a:solidFill>
+                  <a:schemeClr val="bg1"/>
+                </a:solidFill>
+                <a:latin typeface="Century Gothic" panose="020B0502020202020204" pitchFamily="34" charset="0"/>
+              </a:rPr>
+              <a:t> </a:t>
+            </a:r>
+            <a:r>
+              <a:rPr lang="en-US" b="1" dirty="0" err="1">
+                <a:solidFill>
+                  <a:schemeClr val="bg1"/>
+                </a:solidFill>
+                <a:latin typeface="Century Gothic" panose="020B0502020202020204" pitchFamily="34" charset="0"/>
+              </a:rPr>
+              <a:t>Conda</a:t>
+            </a:r>
+            <a:endParaRPr lang="en-US" b="1" dirty="0">
+              <a:solidFill>
+                <a:schemeClr val="bg1"/>
+              </a:solidFill>
+              <a:latin typeface="Century Gothic" panose="020B0502020202020204" pitchFamily="34" charset="0"/>
+            </a:endParaRPr>
           </a:p>
         </p:txBody>
       </p:sp>
@@ -18467,6 +18639,30 @@
               </a:rPr>
               <a:t>Virtual Environments with</a:t>
             </a:r>
+            <a:r>
+              <a:rPr lang="en-US" b="1" dirty="0">
+                <a:solidFill>
+                  <a:schemeClr val="bg1"/>
+                </a:solidFill>
+                <a:latin typeface="Century Gothic" panose="020B0502020202020204" pitchFamily="34" charset="0"/>
+              </a:rPr>
+              <a:t> </a:t>
+            </a:r>
+            <a:r>
+              <a:rPr lang="en-US" b="1" dirty="0" err="1">
+                <a:solidFill>
+                  <a:schemeClr val="bg1"/>
+                </a:solidFill>
+                <a:latin typeface="Century Gothic" panose="020B0502020202020204" pitchFamily="34" charset="0"/>
+              </a:rPr>
+              <a:t>Conda</a:t>
+            </a:r>
+            <a:endParaRPr lang="en-US" b="1" dirty="0">
+              <a:solidFill>
+                <a:schemeClr val="bg1"/>
+              </a:solidFill>
+              <a:latin typeface="Century Gothic" panose="020B0502020202020204" pitchFamily="34" charset="0"/>
+            </a:endParaRPr>
           </a:p>
         </p:txBody>
       </p:sp>
@@ -19340,6 +19536,30 @@
               </a:rPr>
               <a:t>Virtual Environments with</a:t>
             </a:r>
+            <a:r>
+              <a:rPr lang="en-US" b="1" dirty="0">
+                <a:solidFill>
+                  <a:schemeClr val="bg1"/>
+                </a:solidFill>
+                <a:latin typeface="Century Gothic" panose="020B0502020202020204" pitchFamily="34" charset="0"/>
+              </a:rPr>
+              <a:t> </a:t>
+            </a:r>
+            <a:r>
+              <a:rPr lang="en-US" b="1" dirty="0" err="1">
+                <a:solidFill>
+                  <a:schemeClr val="bg1"/>
+                </a:solidFill>
+                <a:latin typeface="Century Gothic" panose="020B0502020202020204" pitchFamily="34" charset="0"/>
+              </a:rPr>
+              <a:t>Conda</a:t>
+            </a:r>
+            <a:endParaRPr lang="en-US" b="1" dirty="0">
+              <a:solidFill>
+                <a:schemeClr val="bg1"/>
+              </a:solidFill>
+              <a:latin typeface="Century Gothic" panose="020B0502020202020204" pitchFamily="34" charset="0"/>
+            </a:endParaRPr>
           </a:p>
         </p:txBody>
       </p:sp>
@@ -20477,6 +20697,30 @@
               </a:rPr>
               <a:t>Virtual Environments with</a:t>
             </a:r>
+            <a:r>
+              <a:rPr lang="en-US" b="1" dirty="0">
+                <a:solidFill>
+                  <a:schemeClr val="bg1"/>
+                </a:solidFill>
+                <a:latin typeface="Century Gothic" panose="020B0502020202020204" pitchFamily="34" charset="0"/>
+              </a:rPr>
+              <a:t> </a:t>
+            </a:r>
+            <a:r>
+              <a:rPr lang="en-US" b="1" dirty="0" err="1">
+                <a:solidFill>
+                  <a:schemeClr val="bg1"/>
+                </a:solidFill>
+                <a:latin typeface="Century Gothic" panose="020B0502020202020204" pitchFamily="34" charset="0"/>
+              </a:rPr>
+              <a:t>Conda</a:t>
+            </a:r>
+            <a:endParaRPr lang="en-US" b="1" dirty="0">
+              <a:solidFill>
+                <a:schemeClr val="bg1"/>
+              </a:solidFill>
+              <a:latin typeface="Century Gothic" panose="020B0502020202020204" pitchFamily="34" charset="0"/>
+            </a:endParaRPr>
           </a:p>
         </p:txBody>
       </p:sp>
@@ -21127,8 +21371,17 @@
               <a:rPr lang="en-US" b="1" dirty="0">
                 <a:latin typeface="Century Gothic" panose="020B0502020202020204" pitchFamily="34" charset="0"/>
               </a:rPr>
-              <a:t>Virtual Environments with</a:t>
-            </a:r>
+              <a:t>Virtual Environments with </a:t>
+            </a:r>
+            <a:r>
+              <a:rPr lang="en-US" b="1" dirty="0" err="1">
+                <a:latin typeface="Century Gothic" panose="020B0502020202020204" pitchFamily="34" charset="0"/>
+              </a:rPr>
+              <a:t>Conda</a:t>
+            </a:r>
+            <a:endParaRPr lang="en-US" b="1" dirty="0">
+              <a:latin typeface="Century Gothic" panose="020B0502020202020204" pitchFamily="34" charset="0"/>
+            </a:endParaRPr>
           </a:p>
         </p:txBody>
       </p:sp>
@@ -22096,10 +22349,34 @@
           <a:lstStyle/>
           <a:p>
             <a:r>
-              <a:rPr lang="en-US" b="1">
+              <a:rPr lang="en-US" b="1" dirty="0">
                 <a:latin typeface="Century Gothic" panose="020B0502020202020204" pitchFamily="34" charset="0"/>
               </a:rPr>
-              <a:t>Containerization With </a:t>
+              <a:t>Containerization with</a:t>
+            </a:r>
+            <a:r>
+              <a:rPr lang="en-US" b="1" dirty="0">
+                <a:solidFill>
+                  <a:schemeClr val="bg1"/>
+                </a:solidFill>
+                <a:latin typeface="Century Gothic" panose="020B0502020202020204" pitchFamily="34" charset="0"/>
+              </a:rPr>
+              <a:t> </a:t>
+            </a:r>
+            <a:r>
+              <a:rPr lang="en-US" b="1" dirty="0" err="1">
+                <a:solidFill>
+                  <a:schemeClr val="bg1"/>
+                </a:solidFill>
+                <a:latin typeface="Century Gothic" panose="020B0502020202020204" pitchFamily="34" charset="0"/>
+              </a:rPr>
+              <a:t>Apptainer</a:t>
+            </a:r>
+            <a:r>
+              <a:rPr lang="en-US" b="1" dirty="0">
+                <a:latin typeface="Century Gothic" panose="020B0502020202020204" pitchFamily="34" charset="0"/>
+              </a:rPr>
+              <a:t> </a:t>
             </a:r>
           </a:p>
         </p:txBody>
@@ -22178,7 +22455,7 @@
               <a:rPr lang="en-US" sz="2800" dirty="0">
                 <a:latin typeface="Century Gothic" panose="020B0502020202020204" pitchFamily="34" charset="0"/>
               </a:rPr>
-              <a:t>pros</a:t>
+              <a:t>Pros</a:t>
             </a:r>
           </a:p>
           <a:p>
@@ -22187,7 +22464,7 @@
               <a:rPr lang="en-US" sz="2400" dirty="0">
                 <a:latin typeface="Century Gothic" panose="020B0502020202020204" pitchFamily="34" charset="0"/>
               </a:rPr>
-              <a:t>portability</a:t>
+              <a:t>Portability</a:t>
             </a:r>
             <a:r>
               <a:rPr lang="en-US" sz="2400" b="1" dirty="0">
@@ -22211,7 +22488,7 @@
               <a:rPr lang="en-US" sz="2400" dirty="0">
                 <a:latin typeface="Century Gothic" panose="020B0502020202020204" pitchFamily="34" charset="0"/>
               </a:rPr>
-              <a:t>reproducibility- because containers are instances of prebuilt isolated software, the software will always execute the same every time</a:t>
+              <a:t>Reproducibility- because containers are instances of prebuilt isolated software, the software will always execute the same every time</a:t>
             </a:r>
           </a:p>
           <a:p>
@@ -22220,7 +22497,7 @@
               <a:rPr lang="en-US" sz="2800" dirty="0">
                 <a:latin typeface="Century Gothic" panose="020B0502020202020204" pitchFamily="34" charset="0"/>
               </a:rPr>
-              <a:t>cons</a:t>
+              <a:t>Cons</a:t>
             </a:r>
           </a:p>
           <a:p>
@@ -22229,7 +22506,7 @@
               <a:rPr lang="en-US" sz="2400" dirty="0">
                 <a:latin typeface="Century Gothic" panose="020B0502020202020204" pitchFamily="34" charset="0"/>
               </a:rPr>
-              <a:t>steeper learning curve than </a:t>
+              <a:t>Steeper learning curve than </a:t>
             </a:r>
             <a:r>
               <a:rPr lang="en-US" sz="2400" dirty="0" err="1">
@@ -22247,7 +22524,7 @@
               <a:rPr lang="en-US" sz="2400" dirty="0">
                 <a:latin typeface="Century Gothic" panose="020B0502020202020204" pitchFamily="34" charset="0"/>
               </a:rPr>
-              <a:t>can be difficult to troubleshoot issues</a:t>
+              <a:t>Can be difficult to troubleshoot issues</a:t>
             </a:r>
           </a:p>
           <a:p>
@@ -22256,7 +22533,7 @@
               <a:rPr lang="en-US" sz="2400" dirty="0">
                 <a:latin typeface="Century Gothic" panose="020B0502020202020204" pitchFamily="34" charset="0"/>
               </a:rPr>
-              <a:t>building containers can be tricky for multi-node MPI applications </a:t>
+              <a:t>Building containers can be tricky for multi-node MPI applications </a:t>
             </a:r>
           </a:p>
         </p:txBody>
@@ -23234,10 +23511,34 @@
           <a:lstStyle/>
           <a:p>
             <a:r>
-              <a:rPr lang="en-US" b="1">
+              <a:rPr lang="en-US" b="1" dirty="0">
                 <a:latin typeface="Century Gothic" panose="020B0502020202020204" pitchFamily="34" charset="0"/>
               </a:rPr>
-              <a:t>Containerization With </a:t>
+              <a:t>Containerization with</a:t>
+            </a:r>
+            <a:r>
+              <a:rPr lang="en-US" b="1" dirty="0">
+                <a:solidFill>
+                  <a:schemeClr val="bg1"/>
+                </a:solidFill>
+                <a:latin typeface="Century Gothic" panose="020B0502020202020204" pitchFamily="34" charset="0"/>
+              </a:rPr>
+              <a:t> </a:t>
+            </a:r>
+            <a:r>
+              <a:rPr lang="en-US" b="1" dirty="0" err="1">
+                <a:solidFill>
+                  <a:schemeClr val="bg1"/>
+                </a:solidFill>
+                <a:latin typeface="Century Gothic" panose="020B0502020202020204" pitchFamily="34" charset="0"/>
+              </a:rPr>
+              <a:t>Apptainer</a:t>
+            </a:r>
+            <a:r>
+              <a:rPr lang="en-US" b="1" dirty="0">
+                <a:latin typeface="Century Gothic" panose="020B0502020202020204" pitchFamily="34" charset="0"/>
+              </a:rPr>
+              <a:t> </a:t>
             </a:r>
           </a:p>
         </p:txBody>
@@ -23329,15 +23630,15 @@
             <a:pPr lvl="1"/>
             <a:r>
               <a:rPr lang="en-US" sz="2800" dirty="0" err="1">
-                <a:latin typeface="Monaco" pitchFamily="2" charset="77"/>
+                <a:latin typeface="Century Gothic" panose="020B0502020202020204" pitchFamily="34" charset="0"/>
               </a:rPr>
               <a:t>Apptainer</a:t>
             </a:r>
             <a:r>
               <a:rPr lang="en-US" sz="2800" dirty="0">
-                <a:latin typeface="Monaco" pitchFamily="2" charset="77"/>
-              </a:rPr>
-              <a:t> comes pre-installed on all Alpine nodes, so no need to load any specific software</a:t>
+                <a:latin typeface="Century Gothic" panose="020B0502020202020204" pitchFamily="34" charset="0"/>
+              </a:rPr>
+              <a:t> comes pre-installed on all Alpine nodes, so no need to load any specific software modules!</a:t>
             </a:r>
           </a:p>
           <a:p>
@@ -23617,10 +23918,34 @@
           <a:lstStyle/>
           <a:p>
             <a:r>
-              <a:rPr lang="en-US" b="1">
+              <a:rPr lang="en-US" b="1" dirty="0">
                 <a:latin typeface="Century Gothic" panose="020B0502020202020204" pitchFamily="34" charset="0"/>
               </a:rPr>
-              <a:t>Containerization With </a:t>
+              <a:t>Containerization with</a:t>
+            </a:r>
+            <a:r>
+              <a:rPr lang="en-US" b="1" dirty="0">
+                <a:solidFill>
+                  <a:schemeClr val="bg1"/>
+                </a:solidFill>
+                <a:latin typeface="Century Gothic" panose="020B0502020202020204" pitchFamily="34" charset="0"/>
+              </a:rPr>
+              <a:t> </a:t>
+            </a:r>
+            <a:r>
+              <a:rPr lang="en-US" b="1" dirty="0" err="1">
+                <a:solidFill>
+                  <a:schemeClr val="bg1"/>
+                </a:solidFill>
+                <a:latin typeface="Century Gothic" panose="020B0502020202020204" pitchFamily="34" charset="0"/>
+              </a:rPr>
+              <a:t>Apptainer</a:t>
+            </a:r>
+            <a:r>
+              <a:rPr lang="en-US" b="1" dirty="0">
+                <a:latin typeface="Century Gothic" panose="020B0502020202020204" pitchFamily="34" charset="0"/>
+              </a:rPr>
+              <a:t> </a:t>
             </a:r>
           </a:p>
         </p:txBody>
@@ -23647,7 +23972,7 @@
         </p:blipFill>
         <p:spPr>
           <a:xfrm>
-            <a:off x="6725748" y="182563"/>
+            <a:off x="6725748" y="136525"/>
             <a:ext cx="5164698" cy="1690686"/>
           </a:xfrm>
           <a:prstGeom prst="rect">
@@ -23720,7 +24045,7 @@
               <a:rPr lang="en-US" sz="2800" dirty="0">
                 <a:latin typeface="Century Gothic" panose="020B0502020202020204" pitchFamily="34" charset="0"/>
               </a:rPr>
-              <a:t>commands</a:t>
+              <a:t>commands:</a:t>
             </a:r>
           </a:p>
         </p:txBody>
@@ -24104,7 +24429,7 @@
                   <a:latin typeface="Courier New" panose="02070309020205020404" pitchFamily="49" charset="0"/>
                   <a:cs typeface="Courier New" panose="02070309020205020404" pitchFamily="49" charset="0"/>
                 </a:rPr>
-                <a:t> shell 		#Shell into your image</a:t>
+                <a:t> shell 		#Access the command line of your container</a:t>
               </a:r>
             </a:p>
             <a:p>
@@ -24200,10 +24525,34 @@
           <a:lstStyle/>
           <a:p>
             <a:r>
-              <a:rPr lang="en-US" b="1">
+              <a:rPr lang="en-US" b="1" dirty="0">
                 <a:latin typeface="Century Gothic" panose="020B0502020202020204" pitchFamily="34" charset="0"/>
               </a:rPr>
-              <a:t>Containerization With </a:t>
+              <a:t>Containerization with</a:t>
+            </a:r>
+            <a:r>
+              <a:rPr lang="en-US" b="1" dirty="0">
+                <a:solidFill>
+                  <a:schemeClr val="bg1"/>
+                </a:solidFill>
+                <a:latin typeface="Century Gothic" panose="020B0502020202020204" pitchFamily="34" charset="0"/>
+              </a:rPr>
+              <a:t> </a:t>
+            </a:r>
+            <a:r>
+              <a:rPr lang="en-US" b="1" dirty="0" err="1">
+                <a:solidFill>
+                  <a:schemeClr val="bg1"/>
+                </a:solidFill>
+                <a:latin typeface="Century Gothic" panose="020B0502020202020204" pitchFamily="34" charset="0"/>
+              </a:rPr>
+              <a:t>Apptainer</a:t>
+            </a:r>
+            <a:r>
+              <a:rPr lang="en-US" b="1" dirty="0">
+                <a:latin typeface="Century Gothic" panose="020B0502020202020204" pitchFamily="34" charset="0"/>
+              </a:rPr>
+              <a:t> </a:t>
             </a:r>
           </a:p>
         </p:txBody>
@@ -26815,7 +27164,7 @@
               <a:rPr lang="en-US" sz="2400" dirty="0">
                 <a:latin typeface="Century Gothic" panose="020B0502020202020204" pitchFamily="34" charset="0"/>
               </a:rPr>
-              <a:t>Log in to CURC HPC system</a:t>
+              <a:t>Log in to the CURC HPC system</a:t>
             </a:r>
           </a:p>
           <a:p>

</xml_diff>